<commit_message>
added names for ports
</commit_message>
<xml_diff>
--- a/tutorials/Tutorial 2 - Adding FMUs/figures/InitialConnections.pptx
+++ b/tutorials/Tutorial 2 - Adding FMUs/figures/InitialConnections.pptx
@@ -3394,6 +3394,10 @@
             </a:r>
             <a:endParaRPr lang="da-DK" dirty="0"/>
           </a:p>
+          <a:p>
+            <a:pPr algn="ctr"/>
+            <a:endParaRPr lang="da-DK" dirty="0"/>
+          </a:p>
         </p:txBody>
       </p:sp>
       <p:sp>
@@ -5179,6 +5183,842 @@
           </a:fontRef>
         </p:style>
       </p:cxnSp>
+      <p:sp>
+        <p:nvSpPr>
+          <p:cNvPr id="96" name="TextBox 95">
+            <a:extLst>
+              <a:ext uri="{FF2B5EF4-FFF2-40B4-BE49-F238E27FC236}">
+                <a16:creationId xmlns:a16="http://schemas.microsoft.com/office/drawing/2014/main" id="{8BFB95D9-13D7-2947-B92E-E6EB7B29BCEA}"/>
+              </a:ext>
+            </a:extLst>
+          </p:cNvPr>
+          <p:cNvSpPr txBox="1"/>
+          <p:nvPr/>
+        </p:nvSpPr>
+        <p:spPr>
+          <a:xfrm>
+            <a:off x="4698306" y="2619825"/>
+            <a:ext cx="757259" cy="307777"/>
+          </a:xfrm>
+          <a:prstGeom prst="rect">
+            <a:avLst/>
+          </a:prstGeom>
+          <a:noFill/>
+        </p:spPr>
+        <p:txBody>
+          <a:bodyPr wrap="none" rtlCol="0">
+            <a:spAutoFit/>
+          </a:bodyPr>
+          <a:lstStyle/>
+          <a:p>
+            <a:r>
+              <a:rPr lang="da-DK" sz="1400" dirty="0" err="1">
+                <a:solidFill>
+                  <a:schemeClr val="bg1"/>
+                </a:solidFill>
+              </a:rPr>
+              <a:t>robot_x</a:t>
+            </a:r>
+            <a:endParaRPr lang="da-DK" sz="1400" dirty="0">
+              <a:solidFill>
+                <a:schemeClr val="bg1"/>
+              </a:solidFill>
+            </a:endParaRPr>
+          </a:p>
+        </p:txBody>
+      </p:sp>
+      <p:sp>
+        <p:nvSpPr>
+          <p:cNvPr id="97" name="TextBox 96">
+            <a:extLst>
+              <a:ext uri="{FF2B5EF4-FFF2-40B4-BE49-F238E27FC236}">
+                <a16:creationId xmlns:a16="http://schemas.microsoft.com/office/drawing/2014/main" id="{00D9E253-C89B-CE4B-ABF1-05DE6618F453}"/>
+              </a:ext>
+            </a:extLst>
+          </p:cNvPr>
+          <p:cNvSpPr txBox="1"/>
+          <p:nvPr/>
+        </p:nvSpPr>
+        <p:spPr>
+          <a:xfrm>
+            <a:off x="5262186" y="2772225"/>
+            <a:ext cx="760465" cy="307777"/>
+          </a:xfrm>
+          <a:prstGeom prst="rect">
+            <a:avLst/>
+          </a:prstGeom>
+          <a:noFill/>
+        </p:spPr>
+        <p:txBody>
+          <a:bodyPr wrap="none" rtlCol="0">
+            <a:spAutoFit/>
+          </a:bodyPr>
+          <a:lstStyle/>
+          <a:p>
+            <a:r>
+              <a:rPr lang="da-DK" sz="1400" dirty="0" err="1">
+                <a:solidFill>
+                  <a:schemeClr val="bg1"/>
+                </a:solidFill>
+              </a:rPr>
+              <a:t>robot_y</a:t>
+            </a:r>
+            <a:endParaRPr lang="da-DK" sz="1400" dirty="0">
+              <a:solidFill>
+                <a:schemeClr val="bg1"/>
+              </a:solidFill>
+            </a:endParaRPr>
+          </a:p>
+        </p:txBody>
+      </p:sp>
+      <p:sp>
+        <p:nvSpPr>
+          <p:cNvPr id="98" name="TextBox 97">
+            <a:extLst>
+              <a:ext uri="{FF2B5EF4-FFF2-40B4-BE49-F238E27FC236}">
+                <a16:creationId xmlns:a16="http://schemas.microsoft.com/office/drawing/2014/main" id="{6AE31A89-AB00-7448-A5E0-C0822BA8F96E}"/>
+              </a:ext>
+            </a:extLst>
+          </p:cNvPr>
+          <p:cNvSpPr txBox="1"/>
+          <p:nvPr/>
+        </p:nvSpPr>
+        <p:spPr>
+          <a:xfrm>
+            <a:off x="5947986" y="2604585"/>
+            <a:ext cx="749244" cy="307777"/>
+          </a:xfrm>
+          <a:prstGeom prst="rect">
+            <a:avLst/>
+          </a:prstGeom>
+          <a:noFill/>
+        </p:spPr>
+        <p:txBody>
+          <a:bodyPr wrap="none" rtlCol="0">
+            <a:spAutoFit/>
+          </a:bodyPr>
+          <a:lstStyle/>
+          <a:p>
+            <a:r>
+              <a:rPr lang="da-DK" sz="1400" dirty="0" err="1">
+                <a:solidFill>
+                  <a:schemeClr val="bg1"/>
+                </a:solidFill>
+              </a:rPr>
+              <a:t>robot_z</a:t>
+            </a:r>
+            <a:endParaRPr lang="da-DK" sz="1400" dirty="0">
+              <a:solidFill>
+                <a:schemeClr val="bg1"/>
+              </a:solidFill>
+            </a:endParaRPr>
+          </a:p>
+        </p:txBody>
+      </p:sp>
+      <p:sp>
+        <p:nvSpPr>
+          <p:cNvPr id="99" name="TextBox 98">
+            <a:extLst>
+              <a:ext uri="{FF2B5EF4-FFF2-40B4-BE49-F238E27FC236}">
+                <a16:creationId xmlns:a16="http://schemas.microsoft.com/office/drawing/2014/main" id="{596C1417-9950-A841-B213-8572CE91BFEF}"/>
+              </a:ext>
+            </a:extLst>
+          </p:cNvPr>
+          <p:cNvSpPr txBox="1"/>
+          <p:nvPr/>
+        </p:nvSpPr>
+        <p:spPr>
+          <a:xfrm>
+            <a:off x="6430511" y="2789102"/>
+            <a:ext cx="1068306" cy="307777"/>
+          </a:xfrm>
+          <a:prstGeom prst="rect">
+            <a:avLst/>
+          </a:prstGeom>
+          <a:noFill/>
+        </p:spPr>
+        <p:txBody>
+          <a:bodyPr wrap="none" rtlCol="0">
+            <a:spAutoFit/>
+          </a:bodyPr>
+          <a:lstStyle/>
+          <a:p>
+            <a:r>
+              <a:rPr lang="da-DK" sz="1400" dirty="0" err="1">
+                <a:solidFill>
+                  <a:schemeClr val="bg1"/>
+                </a:solidFill>
+              </a:rPr>
+              <a:t>robot_theta</a:t>
+            </a:r>
+            <a:endParaRPr lang="da-DK" sz="1400" dirty="0">
+              <a:solidFill>
+                <a:schemeClr val="bg1"/>
+              </a:solidFill>
+            </a:endParaRPr>
+          </a:p>
+        </p:txBody>
+      </p:sp>
+      <p:sp>
+        <p:nvSpPr>
+          <p:cNvPr id="100" name="TextBox 99">
+            <a:extLst>
+              <a:ext uri="{FF2B5EF4-FFF2-40B4-BE49-F238E27FC236}">
+                <a16:creationId xmlns:a16="http://schemas.microsoft.com/office/drawing/2014/main" id="{9E195F32-57E8-DC48-B4A3-EC5EAAEDD6CC}"/>
+              </a:ext>
+            </a:extLst>
+          </p:cNvPr>
+          <p:cNvSpPr txBox="1"/>
+          <p:nvPr/>
+        </p:nvSpPr>
+        <p:spPr>
+          <a:xfrm>
+            <a:off x="1970346" y="3915225"/>
+            <a:ext cx="757259" cy="307777"/>
+          </a:xfrm>
+          <a:prstGeom prst="rect">
+            <a:avLst/>
+          </a:prstGeom>
+          <a:noFill/>
+        </p:spPr>
+        <p:txBody>
+          <a:bodyPr wrap="none" rtlCol="0">
+            <a:spAutoFit/>
+          </a:bodyPr>
+          <a:lstStyle/>
+          <a:p>
+            <a:r>
+              <a:rPr lang="da-DK" sz="1400" dirty="0" err="1">
+                <a:solidFill>
+                  <a:schemeClr val="bg1"/>
+                </a:solidFill>
+              </a:rPr>
+              <a:t>robot_x</a:t>
+            </a:r>
+            <a:endParaRPr lang="da-DK" sz="1400" dirty="0">
+              <a:solidFill>
+                <a:schemeClr val="bg1"/>
+              </a:solidFill>
+            </a:endParaRPr>
+          </a:p>
+        </p:txBody>
+      </p:sp>
+      <p:sp>
+        <p:nvSpPr>
+          <p:cNvPr id="101" name="TextBox 100">
+            <a:extLst>
+              <a:ext uri="{FF2B5EF4-FFF2-40B4-BE49-F238E27FC236}">
+                <a16:creationId xmlns:a16="http://schemas.microsoft.com/office/drawing/2014/main" id="{5CF2DFF8-7189-A84F-ABC5-1F8A5D1B9FFA}"/>
+              </a:ext>
+            </a:extLst>
+          </p:cNvPr>
+          <p:cNvSpPr txBox="1"/>
+          <p:nvPr/>
+        </p:nvSpPr>
+        <p:spPr>
+          <a:xfrm>
+            <a:off x="2534226" y="4067625"/>
+            <a:ext cx="760465" cy="307777"/>
+          </a:xfrm>
+          <a:prstGeom prst="rect">
+            <a:avLst/>
+          </a:prstGeom>
+          <a:noFill/>
+        </p:spPr>
+        <p:txBody>
+          <a:bodyPr wrap="none" rtlCol="0">
+            <a:spAutoFit/>
+          </a:bodyPr>
+          <a:lstStyle/>
+          <a:p>
+            <a:r>
+              <a:rPr lang="da-DK" sz="1400" dirty="0" err="1">
+                <a:solidFill>
+                  <a:schemeClr val="bg1"/>
+                </a:solidFill>
+              </a:rPr>
+              <a:t>robot_y</a:t>
+            </a:r>
+            <a:endParaRPr lang="da-DK" sz="1400" dirty="0">
+              <a:solidFill>
+                <a:schemeClr val="bg1"/>
+              </a:solidFill>
+            </a:endParaRPr>
+          </a:p>
+        </p:txBody>
+      </p:sp>
+      <p:sp>
+        <p:nvSpPr>
+          <p:cNvPr id="102" name="TextBox 101">
+            <a:extLst>
+              <a:ext uri="{FF2B5EF4-FFF2-40B4-BE49-F238E27FC236}">
+                <a16:creationId xmlns:a16="http://schemas.microsoft.com/office/drawing/2014/main" id="{9B35FD21-8A74-4549-93F6-3528F00A23EC}"/>
+              </a:ext>
+            </a:extLst>
+          </p:cNvPr>
+          <p:cNvSpPr txBox="1"/>
+          <p:nvPr/>
+        </p:nvSpPr>
+        <p:spPr>
+          <a:xfrm>
+            <a:off x="3220026" y="3899985"/>
+            <a:ext cx="749244" cy="307777"/>
+          </a:xfrm>
+          <a:prstGeom prst="rect">
+            <a:avLst/>
+          </a:prstGeom>
+          <a:noFill/>
+        </p:spPr>
+        <p:txBody>
+          <a:bodyPr wrap="none" rtlCol="0">
+            <a:spAutoFit/>
+          </a:bodyPr>
+          <a:lstStyle/>
+          <a:p>
+            <a:r>
+              <a:rPr lang="da-DK" sz="1400" dirty="0" err="1">
+                <a:solidFill>
+                  <a:schemeClr val="bg1"/>
+                </a:solidFill>
+              </a:rPr>
+              <a:t>robot_z</a:t>
+            </a:r>
+            <a:endParaRPr lang="da-DK" sz="1400" dirty="0">
+              <a:solidFill>
+                <a:schemeClr val="bg1"/>
+              </a:solidFill>
+            </a:endParaRPr>
+          </a:p>
+        </p:txBody>
+      </p:sp>
+      <p:sp>
+        <p:nvSpPr>
+          <p:cNvPr id="103" name="TextBox 102">
+            <a:extLst>
+              <a:ext uri="{FF2B5EF4-FFF2-40B4-BE49-F238E27FC236}">
+                <a16:creationId xmlns:a16="http://schemas.microsoft.com/office/drawing/2014/main" id="{8AB8F8C2-0F7A-6F41-B7E5-1703DB88C9F6}"/>
+              </a:ext>
+            </a:extLst>
+          </p:cNvPr>
+          <p:cNvSpPr txBox="1"/>
+          <p:nvPr/>
+        </p:nvSpPr>
+        <p:spPr>
+          <a:xfrm>
+            <a:off x="3702551" y="4084502"/>
+            <a:ext cx="1068306" cy="307777"/>
+          </a:xfrm>
+          <a:prstGeom prst="rect">
+            <a:avLst/>
+          </a:prstGeom>
+          <a:noFill/>
+        </p:spPr>
+        <p:txBody>
+          <a:bodyPr wrap="none" rtlCol="0">
+            <a:spAutoFit/>
+          </a:bodyPr>
+          <a:lstStyle/>
+          <a:p>
+            <a:r>
+              <a:rPr lang="da-DK" sz="1400" dirty="0" err="1">
+                <a:solidFill>
+                  <a:schemeClr val="bg1"/>
+                </a:solidFill>
+              </a:rPr>
+              <a:t>robot_theta</a:t>
+            </a:r>
+            <a:endParaRPr lang="da-DK" sz="1400" dirty="0">
+              <a:solidFill>
+                <a:schemeClr val="bg1"/>
+              </a:solidFill>
+            </a:endParaRPr>
+          </a:p>
+        </p:txBody>
+      </p:sp>
+      <p:sp>
+        <p:nvSpPr>
+          <p:cNvPr id="104" name="TextBox 103">
+            <a:extLst>
+              <a:ext uri="{FF2B5EF4-FFF2-40B4-BE49-F238E27FC236}">
+                <a16:creationId xmlns:a16="http://schemas.microsoft.com/office/drawing/2014/main" id="{70D50AAA-E90A-6144-BC0F-7FE7DD22DD25}"/>
+              </a:ext>
+            </a:extLst>
+          </p:cNvPr>
+          <p:cNvSpPr txBox="1"/>
+          <p:nvPr/>
+        </p:nvSpPr>
+        <p:spPr>
+          <a:xfrm>
+            <a:off x="7380546" y="3899985"/>
+            <a:ext cx="757259" cy="307777"/>
+          </a:xfrm>
+          <a:prstGeom prst="rect">
+            <a:avLst/>
+          </a:prstGeom>
+          <a:noFill/>
+        </p:spPr>
+        <p:txBody>
+          <a:bodyPr wrap="none" rtlCol="0">
+            <a:spAutoFit/>
+          </a:bodyPr>
+          <a:lstStyle/>
+          <a:p>
+            <a:r>
+              <a:rPr lang="da-DK" sz="1400" dirty="0" err="1">
+                <a:solidFill>
+                  <a:schemeClr val="bg1"/>
+                </a:solidFill>
+              </a:rPr>
+              <a:t>robot_x</a:t>
+            </a:r>
+            <a:endParaRPr lang="da-DK" sz="1400" dirty="0">
+              <a:solidFill>
+                <a:schemeClr val="bg1"/>
+              </a:solidFill>
+            </a:endParaRPr>
+          </a:p>
+        </p:txBody>
+      </p:sp>
+      <p:sp>
+        <p:nvSpPr>
+          <p:cNvPr id="105" name="TextBox 104">
+            <a:extLst>
+              <a:ext uri="{FF2B5EF4-FFF2-40B4-BE49-F238E27FC236}">
+                <a16:creationId xmlns:a16="http://schemas.microsoft.com/office/drawing/2014/main" id="{60AEB703-D0ED-AF4F-A21E-FB75D5DA56D1}"/>
+              </a:ext>
+            </a:extLst>
+          </p:cNvPr>
+          <p:cNvSpPr txBox="1"/>
+          <p:nvPr/>
+        </p:nvSpPr>
+        <p:spPr>
+          <a:xfrm>
+            <a:off x="7944426" y="4052385"/>
+            <a:ext cx="760465" cy="307777"/>
+          </a:xfrm>
+          <a:prstGeom prst="rect">
+            <a:avLst/>
+          </a:prstGeom>
+          <a:noFill/>
+        </p:spPr>
+        <p:txBody>
+          <a:bodyPr wrap="none" rtlCol="0">
+            <a:spAutoFit/>
+          </a:bodyPr>
+          <a:lstStyle/>
+          <a:p>
+            <a:r>
+              <a:rPr lang="da-DK" sz="1400" dirty="0" err="1">
+                <a:solidFill>
+                  <a:schemeClr val="bg1"/>
+                </a:solidFill>
+              </a:rPr>
+              <a:t>robot_y</a:t>
+            </a:r>
+            <a:endParaRPr lang="da-DK" sz="1400" dirty="0">
+              <a:solidFill>
+                <a:schemeClr val="bg1"/>
+              </a:solidFill>
+            </a:endParaRPr>
+          </a:p>
+        </p:txBody>
+      </p:sp>
+      <p:sp>
+        <p:nvSpPr>
+          <p:cNvPr id="106" name="TextBox 105">
+            <a:extLst>
+              <a:ext uri="{FF2B5EF4-FFF2-40B4-BE49-F238E27FC236}">
+                <a16:creationId xmlns:a16="http://schemas.microsoft.com/office/drawing/2014/main" id="{9C92D0D4-428B-4A4A-AE1A-92B52DAFF696}"/>
+              </a:ext>
+            </a:extLst>
+          </p:cNvPr>
+          <p:cNvSpPr txBox="1"/>
+          <p:nvPr/>
+        </p:nvSpPr>
+        <p:spPr>
+          <a:xfrm>
+            <a:off x="8630226" y="3884745"/>
+            <a:ext cx="749244" cy="307777"/>
+          </a:xfrm>
+          <a:prstGeom prst="rect">
+            <a:avLst/>
+          </a:prstGeom>
+          <a:noFill/>
+        </p:spPr>
+        <p:txBody>
+          <a:bodyPr wrap="none" rtlCol="0">
+            <a:spAutoFit/>
+          </a:bodyPr>
+          <a:lstStyle/>
+          <a:p>
+            <a:r>
+              <a:rPr lang="da-DK" sz="1400" dirty="0" err="1">
+                <a:solidFill>
+                  <a:schemeClr val="bg1"/>
+                </a:solidFill>
+              </a:rPr>
+              <a:t>robot_z</a:t>
+            </a:r>
+            <a:endParaRPr lang="da-DK" sz="1400" dirty="0">
+              <a:solidFill>
+                <a:schemeClr val="bg1"/>
+              </a:solidFill>
+            </a:endParaRPr>
+          </a:p>
+        </p:txBody>
+      </p:sp>
+      <p:sp>
+        <p:nvSpPr>
+          <p:cNvPr id="107" name="TextBox 106">
+            <a:extLst>
+              <a:ext uri="{FF2B5EF4-FFF2-40B4-BE49-F238E27FC236}">
+                <a16:creationId xmlns:a16="http://schemas.microsoft.com/office/drawing/2014/main" id="{317ED762-4AEE-C344-B024-78D826B65365}"/>
+              </a:ext>
+            </a:extLst>
+          </p:cNvPr>
+          <p:cNvSpPr txBox="1"/>
+          <p:nvPr/>
+        </p:nvSpPr>
+        <p:spPr>
+          <a:xfrm>
+            <a:off x="9112751" y="4069262"/>
+            <a:ext cx="1068306" cy="307777"/>
+          </a:xfrm>
+          <a:prstGeom prst="rect">
+            <a:avLst/>
+          </a:prstGeom>
+          <a:noFill/>
+        </p:spPr>
+        <p:txBody>
+          <a:bodyPr wrap="none" rtlCol="0">
+            <a:spAutoFit/>
+          </a:bodyPr>
+          <a:lstStyle/>
+          <a:p>
+            <a:r>
+              <a:rPr lang="da-DK" sz="1400" dirty="0" err="1">
+                <a:solidFill>
+                  <a:schemeClr val="bg1"/>
+                </a:solidFill>
+              </a:rPr>
+              <a:t>robot_theta</a:t>
+            </a:r>
+            <a:endParaRPr lang="da-DK" sz="1400" dirty="0">
+              <a:solidFill>
+                <a:schemeClr val="bg1"/>
+              </a:solidFill>
+            </a:endParaRPr>
+          </a:p>
+        </p:txBody>
+      </p:sp>
+      <p:sp>
+        <p:nvSpPr>
+          <p:cNvPr id="108" name="TextBox 107">
+            <a:extLst>
+              <a:ext uri="{FF2B5EF4-FFF2-40B4-BE49-F238E27FC236}">
+                <a16:creationId xmlns:a16="http://schemas.microsoft.com/office/drawing/2014/main" id="{BCA145C6-A13C-8649-B3DB-C4B80E4813D8}"/>
+              </a:ext>
+            </a:extLst>
+          </p:cNvPr>
+          <p:cNvSpPr txBox="1"/>
+          <p:nvPr/>
+        </p:nvSpPr>
+        <p:spPr>
+          <a:xfrm>
+            <a:off x="4789746" y="5241105"/>
+            <a:ext cx="757259" cy="307777"/>
+          </a:xfrm>
+          <a:prstGeom prst="rect">
+            <a:avLst/>
+          </a:prstGeom>
+          <a:noFill/>
+        </p:spPr>
+        <p:txBody>
+          <a:bodyPr wrap="none" rtlCol="0">
+            <a:spAutoFit/>
+          </a:bodyPr>
+          <a:lstStyle/>
+          <a:p>
+            <a:r>
+              <a:rPr lang="da-DK" sz="1400" dirty="0" err="1">
+                <a:solidFill>
+                  <a:schemeClr val="bg1"/>
+                </a:solidFill>
+              </a:rPr>
+              <a:t>robot_x</a:t>
+            </a:r>
+            <a:endParaRPr lang="da-DK" sz="1400" dirty="0">
+              <a:solidFill>
+                <a:schemeClr val="bg1"/>
+              </a:solidFill>
+            </a:endParaRPr>
+          </a:p>
+        </p:txBody>
+      </p:sp>
+      <p:sp>
+        <p:nvSpPr>
+          <p:cNvPr id="109" name="TextBox 108">
+            <a:extLst>
+              <a:ext uri="{FF2B5EF4-FFF2-40B4-BE49-F238E27FC236}">
+                <a16:creationId xmlns:a16="http://schemas.microsoft.com/office/drawing/2014/main" id="{C5725B47-C0BE-8141-BF0C-68FD3803F698}"/>
+              </a:ext>
+            </a:extLst>
+          </p:cNvPr>
+          <p:cNvSpPr txBox="1"/>
+          <p:nvPr/>
+        </p:nvSpPr>
+        <p:spPr>
+          <a:xfrm>
+            <a:off x="5353626" y="5393505"/>
+            <a:ext cx="760465" cy="307777"/>
+          </a:xfrm>
+          <a:prstGeom prst="rect">
+            <a:avLst/>
+          </a:prstGeom>
+          <a:noFill/>
+        </p:spPr>
+        <p:txBody>
+          <a:bodyPr wrap="none" rtlCol="0">
+            <a:spAutoFit/>
+          </a:bodyPr>
+          <a:lstStyle/>
+          <a:p>
+            <a:r>
+              <a:rPr lang="da-DK" sz="1400" dirty="0" err="1">
+                <a:solidFill>
+                  <a:schemeClr val="bg1"/>
+                </a:solidFill>
+              </a:rPr>
+              <a:t>robot_y</a:t>
+            </a:r>
+            <a:endParaRPr lang="da-DK" sz="1400" dirty="0">
+              <a:solidFill>
+                <a:schemeClr val="bg1"/>
+              </a:solidFill>
+            </a:endParaRPr>
+          </a:p>
+        </p:txBody>
+      </p:sp>
+      <p:sp>
+        <p:nvSpPr>
+          <p:cNvPr id="110" name="TextBox 109">
+            <a:extLst>
+              <a:ext uri="{FF2B5EF4-FFF2-40B4-BE49-F238E27FC236}">
+                <a16:creationId xmlns:a16="http://schemas.microsoft.com/office/drawing/2014/main" id="{7B7CB971-512A-C74F-8E0C-F9E357033BCB}"/>
+              </a:ext>
+            </a:extLst>
+          </p:cNvPr>
+          <p:cNvSpPr txBox="1"/>
+          <p:nvPr/>
+        </p:nvSpPr>
+        <p:spPr>
+          <a:xfrm>
+            <a:off x="6039426" y="5225865"/>
+            <a:ext cx="749244" cy="307777"/>
+          </a:xfrm>
+          <a:prstGeom prst="rect">
+            <a:avLst/>
+          </a:prstGeom>
+          <a:noFill/>
+        </p:spPr>
+        <p:txBody>
+          <a:bodyPr wrap="none" rtlCol="0">
+            <a:spAutoFit/>
+          </a:bodyPr>
+          <a:lstStyle/>
+          <a:p>
+            <a:r>
+              <a:rPr lang="da-DK" sz="1400" dirty="0" err="1">
+                <a:solidFill>
+                  <a:schemeClr val="bg1"/>
+                </a:solidFill>
+              </a:rPr>
+              <a:t>robot_z</a:t>
+            </a:r>
+            <a:endParaRPr lang="da-DK" sz="1400" dirty="0">
+              <a:solidFill>
+                <a:schemeClr val="bg1"/>
+              </a:solidFill>
+            </a:endParaRPr>
+          </a:p>
+        </p:txBody>
+      </p:sp>
+      <p:sp>
+        <p:nvSpPr>
+          <p:cNvPr id="112" name="TextBox 111">
+            <a:extLst>
+              <a:ext uri="{FF2B5EF4-FFF2-40B4-BE49-F238E27FC236}">
+                <a16:creationId xmlns:a16="http://schemas.microsoft.com/office/drawing/2014/main" id="{117A7E5B-9A3D-6F45-B8EE-57D17EDA7AED}"/>
+              </a:ext>
+            </a:extLst>
+          </p:cNvPr>
+          <p:cNvSpPr txBox="1"/>
+          <p:nvPr/>
+        </p:nvSpPr>
+        <p:spPr>
+          <a:xfrm>
+            <a:off x="4726659" y="5940624"/>
+            <a:ext cx="1156214" cy="307777"/>
+          </a:xfrm>
+          <a:prstGeom prst="rect">
+            <a:avLst/>
+          </a:prstGeom>
+          <a:noFill/>
+        </p:spPr>
+        <p:txBody>
+          <a:bodyPr wrap="none" rtlCol="0">
+            <a:spAutoFit/>
+          </a:bodyPr>
+          <a:lstStyle/>
+          <a:p>
+            <a:r>
+              <a:rPr lang="da-DK" sz="1400" dirty="0" err="1">
+                <a:solidFill>
+                  <a:schemeClr val="bg1"/>
+                </a:solidFill>
+              </a:rPr>
+              <a:t>lf.left.reading</a:t>
+            </a:r>
+            <a:endParaRPr lang="da-DK" sz="1400" dirty="0">
+              <a:solidFill>
+                <a:schemeClr val="bg1"/>
+              </a:solidFill>
+            </a:endParaRPr>
+          </a:p>
+        </p:txBody>
+      </p:sp>
+      <p:sp>
+        <p:nvSpPr>
+          <p:cNvPr id="115" name="TextBox 114">
+            <a:extLst>
+              <a:ext uri="{FF2B5EF4-FFF2-40B4-BE49-F238E27FC236}">
+                <a16:creationId xmlns:a16="http://schemas.microsoft.com/office/drawing/2014/main" id="{719CA77D-16DD-EE42-9D74-85487EDB1A54}"/>
+              </a:ext>
+            </a:extLst>
+          </p:cNvPr>
+          <p:cNvSpPr txBox="1"/>
+          <p:nvPr/>
+        </p:nvSpPr>
+        <p:spPr>
+          <a:xfrm>
+            <a:off x="8157603" y="4633188"/>
+            <a:ext cx="1309205" cy="307777"/>
+          </a:xfrm>
+          <a:prstGeom prst="rect">
+            <a:avLst/>
+          </a:prstGeom>
+          <a:noFill/>
+        </p:spPr>
+        <p:txBody>
+          <a:bodyPr wrap="none" rtlCol="0">
+            <a:spAutoFit/>
+          </a:bodyPr>
+          <a:lstStyle/>
+          <a:p>
+            <a:r>
+              <a:rPr lang="da-DK" sz="1400" dirty="0" err="1">
+                <a:solidFill>
+                  <a:schemeClr val="bg1"/>
+                </a:solidFill>
+              </a:rPr>
+              <a:t>sensor_reading</a:t>
+            </a:r>
+            <a:endParaRPr lang="da-DK" sz="1400" dirty="0">
+              <a:solidFill>
+                <a:schemeClr val="bg1"/>
+              </a:solidFill>
+            </a:endParaRPr>
+          </a:p>
+        </p:txBody>
+      </p:sp>
+      <p:sp>
+        <p:nvSpPr>
+          <p:cNvPr id="116" name="TextBox 115">
+            <a:extLst>
+              <a:ext uri="{FF2B5EF4-FFF2-40B4-BE49-F238E27FC236}">
+                <a16:creationId xmlns:a16="http://schemas.microsoft.com/office/drawing/2014/main" id="{B99C264A-4234-704A-A6B5-AD9AD28300F4}"/>
+              </a:ext>
+            </a:extLst>
+          </p:cNvPr>
+          <p:cNvSpPr txBox="1"/>
+          <p:nvPr/>
+        </p:nvSpPr>
+        <p:spPr>
+          <a:xfrm>
+            <a:off x="5935658" y="5910847"/>
+            <a:ext cx="1253933" cy="307777"/>
+          </a:xfrm>
+          <a:prstGeom prst="rect">
+            <a:avLst/>
+          </a:prstGeom>
+          <a:noFill/>
+        </p:spPr>
+        <p:txBody>
+          <a:bodyPr wrap="none" rtlCol="0">
+            <a:spAutoFit/>
+          </a:bodyPr>
+          <a:lstStyle/>
+          <a:p>
+            <a:r>
+              <a:rPr lang="da-DK" sz="1400" dirty="0" err="1">
+                <a:solidFill>
+                  <a:schemeClr val="bg1"/>
+                </a:solidFill>
+              </a:rPr>
+              <a:t>lf.right.reading</a:t>
+            </a:r>
+            <a:endParaRPr lang="da-DK" sz="1400" dirty="0">
+              <a:solidFill>
+                <a:schemeClr val="bg1"/>
+              </a:solidFill>
+            </a:endParaRPr>
+          </a:p>
+        </p:txBody>
+      </p:sp>
+      <p:sp>
+        <p:nvSpPr>
+          <p:cNvPr id="117" name="TextBox 116">
+            <a:extLst>
+              <a:ext uri="{FF2B5EF4-FFF2-40B4-BE49-F238E27FC236}">
+                <a16:creationId xmlns:a16="http://schemas.microsoft.com/office/drawing/2014/main" id="{7701422F-083F-0841-B496-65136BCD0F82}"/>
+              </a:ext>
+            </a:extLst>
+          </p:cNvPr>
+          <p:cNvSpPr txBox="1"/>
+          <p:nvPr/>
+        </p:nvSpPr>
+        <p:spPr>
+          <a:xfrm>
+            <a:off x="2617309" y="4602320"/>
+            <a:ext cx="1309205" cy="307777"/>
+          </a:xfrm>
+          <a:prstGeom prst="rect">
+            <a:avLst/>
+          </a:prstGeom>
+          <a:noFill/>
+        </p:spPr>
+        <p:txBody>
+          <a:bodyPr wrap="none" rtlCol="0">
+            <a:spAutoFit/>
+          </a:bodyPr>
+          <a:lstStyle/>
+          <a:p>
+            <a:r>
+              <a:rPr lang="da-DK" sz="1400" dirty="0" err="1">
+                <a:solidFill>
+                  <a:schemeClr val="bg1"/>
+                </a:solidFill>
+              </a:rPr>
+              <a:t>sensor_reading</a:t>
+            </a:r>
+            <a:endParaRPr lang="da-DK" sz="1400" dirty="0">
+              <a:solidFill>
+                <a:schemeClr val="bg1"/>
+              </a:solidFill>
+            </a:endParaRPr>
+          </a:p>
+        </p:txBody>
+      </p:sp>
     </p:spTree>
     <p:extLst>
       <p:ext uri="{BB962C8B-B14F-4D97-AF65-F5344CB8AC3E}">

</xml_diff>